<commit_message>
added week 2 individual progress report
</commit_message>
<xml_diff>
--- a/avionics/Week 1/Edwin Mwiti Week 1 progress report.pptx
+++ b/avionics/Week 1/Edwin Mwiti Week 1 progress report.pptx
@@ -109,6 +109,11 @@
       </a:defRPr>
     </a:lvl9pPr>
   </p:defaultTextStyle>
+  <p:extLst>
+    <p:ext uri="{EFAFB233-063F-42B5-8137-9DF3F51BA10A}">
+      <p15:sldGuideLst xmlns:p15="http://schemas.microsoft.com/office/powerpoint/2012/main"/>
+    </p:ext>
+  </p:extLst>
 </p:presentation>
 </file>
 
@@ -6287,8 +6292,12 @@
           <a:lstStyle/>
           <a:p>
             <a:r>
+              <a:rPr lang="en-US" b="1"/>
+              <a:t>Tasks last </a:t>
+            </a:r>
+            <a:r>
               <a:rPr lang="en-US" b="1" dirty="0"/>
-              <a:t>Tasks this week</a:t>
+              <a:t>week</a:t>
             </a:r>
           </a:p>
         </p:txBody>

</xml_diff>